<commit_message>
Code and ppt updates
</commit_message>
<xml_diff>
--- a/DATA604_Final/Solar Photovoltaic System Simulation.pptx
+++ b/DATA604_Final/Solar Photovoltaic System Simulation.pptx
@@ -4,12 +4,18 @@
   <p:sldMasterIdLst>
     <p:sldMasterId id="2147483648" r:id="rId1"/>
   </p:sldMasterIdLst>
+  <p:notesMasterIdLst>
+    <p:notesMasterId r:id="rId10"/>
+  </p:notesMasterIdLst>
   <p:sldIdLst>
     <p:sldId id="256" r:id="rId2"/>
-    <p:sldId id="257" r:id="rId3"/>
-    <p:sldId id="262" r:id="rId4"/>
-    <p:sldId id="261" r:id="rId5"/>
-    <p:sldId id="260" r:id="rId6"/>
+    <p:sldId id="263" r:id="rId3"/>
+    <p:sldId id="267" r:id="rId4"/>
+    <p:sldId id="268" r:id="rId5"/>
+    <p:sldId id="266" r:id="rId6"/>
+    <p:sldId id="265" r:id="rId7"/>
+    <p:sldId id="264" r:id="rId8"/>
+    <p:sldId id="269" r:id="rId9"/>
   </p:sldIdLst>
   <p:sldSz cx="9144000" cy="6858000" type="screen4x3"/>
   <p:notesSz cx="6858000" cy="9144000"/>
@@ -111,6 +117,353 @@
 </p:presentation>
 </file>
 
+<file path=ppt/notesMasters/notesMaster1.xml><?xml version="1.0" encoding="utf-8"?>
+<p:notesMaster xmlns:a="http://schemas.openxmlformats.org/drawingml/2006/main" xmlns:r="http://schemas.openxmlformats.org/officeDocument/2006/relationships" xmlns:p="http://schemas.openxmlformats.org/presentationml/2006/main">
+  <p:cSld>
+    <p:bg>
+      <p:bgRef idx="1001">
+        <a:schemeClr val="bg1"/>
+      </p:bgRef>
+    </p:bg>
+    <p:spTree>
+      <p:nvGrpSpPr>
+        <p:cNvPr id="1" name=""/>
+        <p:cNvGrpSpPr/>
+        <p:nvPr/>
+      </p:nvGrpSpPr>
+      <p:grpSpPr>
+        <a:xfrm>
+          <a:off x="0" y="0"/>
+          <a:ext cx="0" cy="0"/>
+          <a:chOff x="0" y="0"/>
+          <a:chExt cx="0" cy="0"/>
+        </a:xfrm>
+      </p:grpSpPr>
+      <p:sp>
+        <p:nvSpPr>
+          <p:cNvPr id="2" name="Header Placeholder 1"/>
+          <p:cNvSpPr>
+            <a:spLocks noGrp="1"/>
+          </p:cNvSpPr>
+          <p:nvPr>
+            <p:ph type="hdr" sz="quarter"/>
+          </p:nvPr>
+        </p:nvSpPr>
+        <p:spPr>
+          <a:xfrm>
+            <a:off x="0" y="0"/>
+            <a:ext cx="2971800" cy="457200"/>
+          </a:xfrm>
+          <a:prstGeom prst="rect">
+            <a:avLst/>
+          </a:prstGeom>
+        </p:spPr>
+        <p:txBody>
+          <a:bodyPr vert="horz" lIns="91440" tIns="45720" rIns="91440" bIns="45720" rtlCol="0"/>
+          <a:lstStyle>
+            <a:lvl1pPr algn="l">
+              <a:defRPr sz="1200"/>
+            </a:lvl1pPr>
+          </a:lstStyle>
+          <a:p>
+            <a:endParaRPr lang="en-US"/>
+          </a:p>
+        </p:txBody>
+      </p:sp>
+      <p:sp>
+        <p:nvSpPr>
+          <p:cNvPr id="3" name="Date Placeholder 2"/>
+          <p:cNvSpPr>
+            <a:spLocks noGrp="1"/>
+          </p:cNvSpPr>
+          <p:nvPr>
+            <p:ph type="dt" idx="1"/>
+          </p:nvPr>
+        </p:nvSpPr>
+        <p:spPr>
+          <a:xfrm>
+            <a:off x="3884613" y="0"/>
+            <a:ext cx="2971800" cy="457200"/>
+          </a:xfrm>
+          <a:prstGeom prst="rect">
+            <a:avLst/>
+          </a:prstGeom>
+        </p:spPr>
+        <p:txBody>
+          <a:bodyPr vert="horz" lIns="91440" tIns="45720" rIns="91440" bIns="45720" rtlCol="0"/>
+          <a:lstStyle>
+            <a:lvl1pPr algn="r">
+              <a:defRPr sz="1200"/>
+            </a:lvl1pPr>
+          </a:lstStyle>
+          <a:p>
+            <a:fld id="{B2546F39-20FB-40AC-ACB7-1A5BC824CD74}" type="datetimeFigureOut">
+              <a:rPr lang="en-US" smtClean="0"/>
+              <a:t>12/12/2016</a:t>
+            </a:fld>
+            <a:endParaRPr lang="en-US"/>
+          </a:p>
+        </p:txBody>
+      </p:sp>
+      <p:sp>
+        <p:nvSpPr>
+          <p:cNvPr id="4" name="Slide Image Placeholder 3"/>
+          <p:cNvSpPr>
+            <a:spLocks noGrp="1" noRot="1" noChangeAspect="1"/>
+          </p:cNvSpPr>
+          <p:nvPr>
+            <p:ph type="sldImg" idx="2"/>
+          </p:nvPr>
+        </p:nvSpPr>
+        <p:spPr>
+          <a:xfrm>
+            <a:off x="1143000" y="685800"/>
+            <a:ext cx="4572000" cy="3429000"/>
+          </a:xfrm>
+          <a:prstGeom prst="rect">
+            <a:avLst/>
+          </a:prstGeom>
+          <a:noFill/>
+          <a:ln w="12700">
+            <a:solidFill>
+              <a:prstClr val="black"/>
+            </a:solidFill>
+          </a:ln>
+        </p:spPr>
+        <p:txBody>
+          <a:bodyPr vert="horz" lIns="91440" tIns="45720" rIns="91440" bIns="45720" rtlCol="0" anchor="ctr"/>
+          <a:lstStyle/>
+          <a:p>
+            <a:endParaRPr lang="en-US"/>
+          </a:p>
+        </p:txBody>
+      </p:sp>
+      <p:sp>
+        <p:nvSpPr>
+          <p:cNvPr id="5" name="Notes Placeholder 4"/>
+          <p:cNvSpPr>
+            <a:spLocks noGrp="1"/>
+          </p:cNvSpPr>
+          <p:nvPr>
+            <p:ph type="body" sz="quarter" idx="3"/>
+          </p:nvPr>
+        </p:nvSpPr>
+        <p:spPr>
+          <a:xfrm>
+            <a:off x="685800" y="4343400"/>
+            <a:ext cx="5486400" cy="4114800"/>
+          </a:xfrm>
+          <a:prstGeom prst="rect">
+            <a:avLst/>
+          </a:prstGeom>
+        </p:spPr>
+        <p:txBody>
+          <a:bodyPr vert="horz" lIns="91440" tIns="45720" rIns="91440" bIns="45720" rtlCol="0">
+            <a:normAutofit/>
+          </a:bodyPr>
+          <a:lstStyle/>
+          <a:p>
+            <a:pPr lvl="0"/>
+            <a:r>
+              <a:rPr lang="en-US" smtClean="0"/>
+              <a:t>Click to edit Master text styles</a:t>
+            </a:r>
+          </a:p>
+          <a:p>
+            <a:pPr lvl="1"/>
+            <a:r>
+              <a:rPr lang="en-US" smtClean="0"/>
+              <a:t>Second level</a:t>
+            </a:r>
+          </a:p>
+          <a:p>
+            <a:pPr lvl="2"/>
+            <a:r>
+              <a:rPr lang="en-US" smtClean="0"/>
+              <a:t>Third level</a:t>
+            </a:r>
+          </a:p>
+          <a:p>
+            <a:pPr lvl="3"/>
+            <a:r>
+              <a:rPr lang="en-US" smtClean="0"/>
+              <a:t>Fourth level</a:t>
+            </a:r>
+          </a:p>
+          <a:p>
+            <a:pPr lvl="4"/>
+            <a:r>
+              <a:rPr lang="en-US" smtClean="0"/>
+              <a:t>Fifth level</a:t>
+            </a:r>
+            <a:endParaRPr lang="en-US"/>
+          </a:p>
+        </p:txBody>
+      </p:sp>
+      <p:sp>
+        <p:nvSpPr>
+          <p:cNvPr id="6" name="Footer Placeholder 5"/>
+          <p:cNvSpPr>
+            <a:spLocks noGrp="1"/>
+          </p:cNvSpPr>
+          <p:nvPr>
+            <p:ph type="ftr" sz="quarter" idx="4"/>
+          </p:nvPr>
+        </p:nvSpPr>
+        <p:spPr>
+          <a:xfrm>
+            <a:off x="0" y="8685213"/>
+            <a:ext cx="2971800" cy="457200"/>
+          </a:xfrm>
+          <a:prstGeom prst="rect">
+            <a:avLst/>
+          </a:prstGeom>
+        </p:spPr>
+        <p:txBody>
+          <a:bodyPr vert="horz" lIns="91440" tIns="45720" rIns="91440" bIns="45720" rtlCol="0" anchor="b"/>
+          <a:lstStyle>
+            <a:lvl1pPr algn="l">
+              <a:defRPr sz="1200"/>
+            </a:lvl1pPr>
+          </a:lstStyle>
+          <a:p>
+            <a:endParaRPr lang="en-US"/>
+          </a:p>
+        </p:txBody>
+      </p:sp>
+      <p:sp>
+        <p:nvSpPr>
+          <p:cNvPr id="7" name="Slide Number Placeholder 6"/>
+          <p:cNvSpPr>
+            <a:spLocks noGrp="1"/>
+          </p:cNvSpPr>
+          <p:nvPr>
+            <p:ph type="sldNum" sz="quarter" idx="5"/>
+          </p:nvPr>
+        </p:nvSpPr>
+        <p:spPr>
+          <a:xfrm>
+            <a:off x="3884613" y="8685213"/>
+            <a:ext cx="2971800" cy="457200"/>
+          </a:xfrm>
+          <a:prstGeom prst="rect">
+            <a:avLst/>
+          </a:prstGeom>
+        </p:spPr>
+        <p:txBody>
+          <a:bodyPr vert="horz" lIns="91440" tIns="45720" rIns="91440" bIns="45720" rtlCol="0" anchor="b"/>
+          <a:lstStyle>
+            <a:lvl1pPr algn="r">
+              <a:defRPr sz="1200"/>
+            </a:lvl1pPr>
+          </a:lstStyle>
+          <a:p>
+            <a:fld id="{E6CD37FD-8CFF-4454-824C-85B303ECF787}" type="slidenum">
+              <a:rPr lang="en-US" smtClean="0"/>
+              <a:t>‹#›</a:t>
+            </a:fld>
+            <a:endParaRPr lang="en-US"/>
+          </a:p>
+        </p:txBody>
+      </p:sp>
+    </p:spTree>
+  </p:cSld>
+  <p:clrMap bg1="lt1" tx1="dk1" bg2="lt2" tx2="dk2" accent1="accent1" accent2="accent2" accent3="accent3" accent4="accent4" accent5="accent5" accent6="accent6" hlink="hlink" folHlink="folHlink"/>
+  <p:notesStyle>
+    <a:lvl1pPr marL="0" algn="l" defTabSz="914400" rtl="0" eaLnBrk="1" latinLnBrk="0" hangingPunct="1">
+      <a:defRPr sz="1200" kern="1200">
+        <a:solidFill>
+          <a:schemeClr val="tx1"/>
+        </a:solidFill>
+        <a:latin typeface="+mn-lt"/>
+        <a:ea typeface="+mn-ea"/>
+        <a:cs typeface="+mn-cs"/>
+      </a:defRPr>
+    </a:lvl1pPr>
+    <a:lvl2pPr marL="457200" algn="l" defTabSz="914400" rtl="0" eaLnBrk="1" latinLnBrk="0" hangingPunct="1">
+      <a:defRPr sz="1200" kern="1200">
+        <a:solidFill>
+          <a:schemeClr val="tx1"/>
+        </a:solidFill>
+        <a:latin typeface="+mn-lt"/>
+        <a:ea typeface="+mn-ea"/>
+        <a:cs typeface="+mn-cs"/>
+      </a:defRPr>
+    </a:lvl2pPr>
+    <a:lvl3pPr marL="914400" algn="l" defTabSz="914400" rtl="0" eaLnBrk="1" latinLnBrk="0" hangingPunct="1">
+      <a:defRPr sz="1200" kern="1200">
+        <a:solidFill>
+          <a:schemeClr val="tx1"/>
+        </a:solidFill>
+        <a:latin typeface="+mn-lt"/>
+        <a:ea typeface="+mn-ea"/>
+        <a:cs typeface="+mn-cs"/>
+      </a:defRPr>
+    </a:lvl3pPr>
+    <a:lvl4pPr marL="1371600" algn="l" defTabSz="914400" rtl="0" eaLnBrk="1" latinLnBrk="0" hangingPunct="1">
+      <a:defRPr sz="1200" kern="1200">
+        <a:solidFill>
+          <a:schemeClr val="tx1"/>
+        </a:solidFill>
+        <a:latin typeface="+mn-lt"/>
+        <a:ea typeface="+mn-ea"/>
+        <a:cs typeface="+mn-cs"/>
+      </a:defRPr>
+    </a:lvl4pPr>
+    <a:lvl5pPr marL="1828800" algn="l" defTabSz="914400" rtl="0" eaLnBrk="1" latinLnBrk="0" hangingPunct="1">
+      <a:defRPr sz="1200" kern="1200">
+        <a:solidFill>
+          <a:schemeClr val="tx1"/>
+        </a:solidFill>
+        <a:latin typeface="+mn-lt"/>
+        <a:ea typeface="+mn-ea"/>
+        <a:cs typeface="+mn-cs"/>
+      </a:defRPr>
+    </a:lvl5pPr>
+    <a:lvl6pPr marL="2286000" algn="l" defTabSz="914400" rtl="0" eaLnBrk="1" latinLnBrk="0" hangingPunct="1">
+      <a:defRPr sz="1200" kern="1200">
+        <a:solidFill>
+          <a:schemeClr val="tx1"/>
+        </a:solidFill>
+        <a:latin typeface="+mn-lt"/>
+        <a:ea typeface="+mn-ea"/>
+        <a:cs typeface="+mn-cs"/>
+      </a:defRPr>
+    </a:lvl6pPr>
+    <a:lvl7pPr marL="2743200" algn="l" defTabSz="914400" rtl="0" eaLnBrk="1" latinLnBrk="0" hangingPunct="1">
+      <a:defRPr sz="1200" kern="1200">
+        <a:solidFill>
+          <a:schemeClr val="tx1"/>
+        </a:solidFill>
+        <a:latin typeface="+mn-lt"/>
+        <a:ea typeface="+mn-ea"/>
+        <a:cs typeface="+mn-cs"/>
+      </a:defRPr>
+    </a:lvl7pPr>
+    <a:lvl8pPr marL="3200400" algn="l" defTabSz="914400" rtl="0" eaLnBrk="1" latinLnBrk="0" hangingPunct="1">
+      <a:defRPr sz="1200" kern="1200">
+        <a:solidFill>
+          <a:schemeClr val="tx1"/>
+        </a:solidFill>
+        <a:latin typeface="+mn-lt"/>
+        <a:ea typeface="+mn-ea"/>
+        <a:cs typeface="+mn-cs"/>
+      </a:defRPr>
+    </a:lvl8pPr>
+    <a:lvl9pPr marL="3657600" algn="l" defTabSz="914400" rtl="0" eaLnBrk="1" latinLnBrk="0" hangingPunct="1">
+      <a:defRPr sz="1200" kern="1200">
+        <a:solidFill>
+          <a:schemeClr val="tx1"/>
+        </a:solidFill>
+        <a:latin typeface="+mn-lt"/>
+        <a:ea typeface="+mn-ea"/>
+        <a:cs typeface="+mn-cs"/>
+      </a:defRPr>
+    </a:lvl9pPr>
+  </p:notesStyle>
+</p:notesMaster>
+</file>
+
 <file path=ppt/slideLayouts/slideLayout1.xml><?xml version="1.0" encoding="utf-8"?>
 <p:sldLayout xmlns:a="http://schemas.openxmlformats.org/drawingml/2006/main" xmlns:r="http://schemas.openxmlformats.org/officeDocument/2006/relationships" xmlns:p="http://schemas.openxmlformats.org/presentationml/2006/main" showMasterSp="0" type="title" preserve="1">
   <p:cSld name="Title Slide">
@@ -292,7 +645,8 @@
           <a:p>
             <a:fld id="{3877EA91-E04C-4D1C-A39E-FBD0799BEDD7}" type="datetimeFigureOut">
               <a:rPr lang="en-US" smtClean="0"/>
-              <a:t>12/11/2016</a:t>
+              <a:pPr/>
+              <a:t>12/12/2016</a:t>
             </a:fld>
             <a:endParaRPr lang="en-US"/>
           </a:p>
@@ -334,6 +688,7 @@
           <a:p>
             <a:fld id="{F9AA22BD-C43E-434F-87E0-4742B4EDAD8C}" type="slidenum">
               <a:rPr lang="en-US" smtClean="0"/>
+              <a:pPr/>
               <a:t>‹#›</a:t>
             </a:fld>
             <a:endParaRPr lang="en-US"/>
@@ -343,7 +698,7 @@
     </p:spTree>
     <p:extLst>
       <p:ext uri="{BB962C8B-B14F-4D97-AF65-F5344CB8AC3E}">
-        <p14:creationId xmlns:p14="http://schemas.microsoft.com/office/powerpoint/2010/main" val="209635610"/>
+        <p14:creationId xmlns:p14="http://schemas.microsoft.com/office/powerpoint/2010/main" xmlns="" val="209635610"/>
       </p:ext>
     </p:extLst>
   </p:cSld>
@@ -462,7 +817,8 @@
           <a:p>
             <a:fld id="{3877EA91-E04C-4D1C-A39E-FBD0799BEDD7}" type="datetimeFigureOut">
               <a:rPr lang="en-US" smtClean="0"/>
-              <a:t>12/11/2016</a:t>
+              <a:pPr/>
+              <a:t>12/12/2016</a:t>
             </a:fld>
             <a:endParaRPr lang="en-US"/>
           </a:p>
@@ -504,6 +860,7 @@
           <a:p>
             <a:fld id="{F9AA22BD-C43E-434F-87E0-4742B4EDAD8C}" type="slidenum">
               <a:rPr lang="en-US" smtClean="0"/>
+              <a:pPr/>
               <a:t>‹#›</a:t>
             </a:fld>
             <a:endParaRPr lang="en-US"/>
@@ -513,7 +870,7 @@
     </p:spTree>
     <p:extLst>
       <p:ext uri="{BB962C8B-B14F-4D97-AF65-F5344CB8AC3E}">
-        <p14:creationId xmlns:p14="http://schemas.microsoft.com/office/powerpoint/2010/main" val="3418171736"/>
+        <p14:creationId xmlns:p14="http://schemas.microsoft.com/office/powerpoint/2010/main" xmlns="" val="3418171736"/>
       </p:ext>
     </p:extLst>
   </p:cSld>
@@ -642,7 +999,8 @@
           <a:p>
             <a:fld id="{3877EA91-E04C-4D1C-A39E-FBD0799BEDD7}" type="datetimeFigureOut">
               <a:rPr lang="en-US" smtClean="0"/>
-              <a:t>12/11/2016</a:t>
+              <a:pPr/>
+              <a:t>12/12/2016</a:t>
             </a:fld>
             <a:endParaRPr lang="en-US"/>
           </a:p>
@@ -684,6 +1042,7 @@
           <a:p>
             <a:fld id="{F9AA22BD-C43E-434F-87E0-4742B4EDAD8C}" type="slidenum">
               <a:rPr lang="en-US" smtClean="0"/>
+              <a:pPr/>
               <a:t>‹#›</a:t>
             </a:fld>
             <a:endParaRPr lang="en-US"/>
@@ -693,7 +1052,7 @@
     </p:spTree>
     <p:extLst>
       <p:ext uri="{BB962C8B-B14F-4D97-AF65-F5344CB8AC3E}">
-        <p14:creationId xmlns:p14="http://schemas.microsoft.com/office/powerpoint/2010/main" val="867631473"/>
+        <p14:creationId xmlns:p14="http://schemas.microsoft.com/office/powerpoint/2010/main" xmlns="" val="867631473"/>
       </p:ext>
     </p:extLst>
   </p:cSld>
@@ -812,7 +1171,8 @@
           <a:p>
             <a:fld id="{3877EA91-E04C-4D1C-A39E-FBD0799BEDD7}" type="datetimeFigureOut">
               <a:rPr lang="en-US" smtClean="0"/>
-              <a:t>12/11/2016</a:t>
+              <a:pPr/>
+              <a:t>12/12/2016</a:t>
             </a:fld>
             <a:endParaRPr lang="en-US"/>
           </a:p>
@@ -854,6 +1214,7 @@
           <a:p>
             <a:fld id="{F9AA22BD-C43E-434F-87E0-4742B4EDAD8C}" type="slidenum">
               <a:rPr lang="en-US" smtClean="0"/>
+              <a:pPr/>
               <a:t>‹#›</a:t>
             </a:fld>
             <a:endParaRPr lang="en-US"/>
@@ -863,7 +1224,7 @@
     </p:spTree>
     <p:extLst>
       <p:ext uri="{BB962C8B-B14F-4D97-AF65-F5344CB8AC3E}">
-        <p14:creationId xmlns:p14="http://schemas.microsoft.com/office/powerpoint/2010/main" val="1948375686"/>
+        <p14:creationId xmlns:p14="http://schemas.microsoft.com/office/powerpoint/2010/main" xmlns="" val="1948375686"/>
       </p:ext>
     </p:extLst>
   </p:cSld>
@@ -1058,7 +1419,8 @@
           <a:p>
             <a:fld id="{3877EA91-E04C-4D1C-A39E-FBD0799BEDD7}" type="datetimeFigureOut">
               <a:rPr lang="en-US" smtClean="0"/>
-              <a:t>12/11/2016</a:t>
+              <a:pPr/>
+              <a:t>12/12/2016</a:t>
             </a:fld>
             <a:endParaRPr lang="en-US"/>
           </a:p>
@@ -1100,6 +1462,7 @@
           <a:p>
             <a:fld id="{F9AA22BD-C43E-434F-87E0-4742B4EDAD8C}" type="slidenum">
               <a:rPr lang="en-US" smtClean="0"/>
+              <a:pPr/>
               <a:t>‹#›</a:t>
             </a:fld>
             <a:endParaRPr lang="en-US"/>
@@ -1109,7 +1472,7 @@
     </p:spTree>
     <p:extLst>
       <p:ext uri="{BB962C8B-B14F-4D97-AF65-F5344CB8AC3E}">
-        <p14:creationId xmlns:p14="http://schemas.microsoft.com/office/powerpoint/2010/main" val="1903787647"/>
+        <p14:creationId xmlns:p14="http://schemas.microsoft.com/office/powerpoint/2010/main" xmlns="" val="1903787647"/>
       </p:ext>
     </p:extLst>
   </p:cSld>
@@ -1346,7 +1709,8 @@
           <a:p>
             <a:fld id="{3877EA91-E04C-4D1C-A39E-FBD0799BEDD7}" type="datetimeFigureOut">
               <a:rPr lang="en-US" smtClean="0"/>
-              <a:t>12/11/2016</a:t>
+              <a:pPr/>
+              <a:t>12/12/2016</a:t>
             </a:fld>
             <a:endParaRPr lang="en-US"/>
           </a:p>
@@ -1388,6 +1752,7 @@
           <a:p>
             <a:fld id="{F9AA22BD-C43E-434F-87E0-4742B4EDAD8C}" type="slidenum">
               <a:rPr lang="en-US" smtClean="0"/>
+              <a:pPr/>
               <a:t>‹#›</a:t>
             </a:fld>
             <a:endParaRPr lang="en-US"/>
@@ -1397,7 +1762,7 @@
     </p:spTree>
     <p:extLst>
       <p:ext uri="{BB962C8B-B14F-4D97-AF65-F5344CB8AC3E}">
-        <p14:creationId xmlns:p14="http://schemas.microsoft.com/office/powerpoint/2010/main" val="1035553531"/>
+        <p14:creationId xmlns:p14="http://schemas.microsoft.com/office/powerpoint/2010/main" xmlns="" val="1035553531"/>
       </p:ext>
     </p:extLst>
   </p:cSld>
@@ -1768,7 +2133,8 @@
           <a:p>
             <a:fld id="{3877EA91-E04C-4D1C-A39E-FBD0799BEDD7}" type="datetimeFigureOut">
               <a:rPr lang="en-US" smtClean="0"/>
-              <a:t>12/11/2016</a:t>
+              <a:pPr/>
+              <a:t>12/12/2016</a:t>
             </a:fld>
             <a:endParaRPr lang="en-US"/>
           </a:p>
@@ -1810,6 +2176,7 @@
           <a:p>
             <a:fld id="{F9AA22BD-C43E-434F-87E0-4742B4EDAD8C}" type="slidenum">
               <a:rPr lang="en-US" smtClean="0"/>
+              <a:pPr/>
               <a:t>‹#›</a:t>
             </a:fld>
             <a:endParaRPr lang="en-US"/>
@@ -1819,7 +2186,7 @@
     </p:spTree>
     <p:extLst>
       <p:ext uri="{BB962C8B-B14F-4D97-AF65-F5344CB8AC3E}">
-        <p14:creationId xmlns:p14="http://schemas.microsoft.com/office/powerpoint/2010/main" val="453774783"/>
+        <p14:creationId xmlns:p14="http://schemas.microsoft.com/office/powerpoint/2010/main" xmlns="" val="453774783"/>
       </p:ext>
     </p:extLst>
   </p:cSld>
@@ -1886,7 +2253,8 @@
           <a:p>
             <a:fld id="{3877EA91-E04C-4D1C-A39E-FBD0799BEDD7}" type="datetimeFigureOut">
               <a:rPr lang="en-US" smtClean="0"/>
-              <a:t>12/11/2016</a:t>
+              <a:pPr/>
+              <a:t>12/12/2016</a:t>
             </a:fld>
             <a:endParaRPr lang="en-US"/>
           </a:p>
@@ -1928,6 +2296,7 @@
           <a:p>
             <a:fld id="{F9AA22BD-C43E-434F-87E0-4742B4EDAD8C}" type="slidenum">
               <a:rPr lang="en-US" smtClean="0"/>
+              <a:pPr/>
               <a:t>‹#›</a:t>
             </a:fld>
             <a:endParaRPr lang="en-US"/>
@@ -1937,7 +2306,7 @@
     </p:spTree>
     <p:extLst>
       <p:ext uri="{BB962C8B-B14F-4D97-AF65-F5344CB8AC3E}">
-        <p14:creationId xmlns:p14="http://schemas.microsoft.com/office/powerpoint/2010/main" val="2001349477"/>
+        <p14:creationId xmlns:p14="http://schemas.microsoft.com/office/powerpoint/2010/main" xmlns="" val="2001349477"/>
       </p:ext>
     </p:extLst>
   </p:cSld>
@@ -1981,7 +2350,8 @@
           <a:p>
             <a:fld id="{3877EA91-E04C-4D1C-A39E-FBD0799BEDD7}" type="datetimeFigureOut">
               <a:rPr lang="en-US" smtClean="0"/>
-              <a:t>12/11/2016</a:t>
+              <a:pPr/>
+              <a:t>12/12/2016</a:t>
             </a:fld>
             <a:endParaRPr lang="en-US"/>
           </a:p>
@@ -2023,6 +2393,7 @@
           <a:p>
             <a:fld id="{F9AA22BD-C43E-434F-87E0-4742B4EDAD8C}" type="slidenum">
               <a:rPr lang="en-US" smtClean="0"/>
+              <a:pPr/>
               <a:t>‹#›</a:t>
             </a:fld>
             <a:endParaRPr lang="en-US"/>
@@ -2032,7 +2403,7 @@
     </p:spTree>
     <p:extLst>
       <p:ext uri="{BB962C8B-B14F-4D97-AF65-F5344CB8AC3E}">
-        <p14:creationId xmlns:p14="http://schemas.microsoft.com/office/powerpoint/2010/main" val="1820672657"/>
+        <p14:creationId xmlns:p14="http://schemas.microsoft.com/office/powerpoint/2010/main" xmlns="" val="1820672657"/>
       </p:ext>
     </p:extLst>
   </p:cSld>
@@ -2258,7 +2629,8 @@
           <a:p>
             <a:fld id="{3877EA91-E04C-4D1C-A39E-FBD0799BEDD7}" type="datetimeFigureOut">
               <a:rPr lang="en-US" smtClean="0"/>
-              <a:t>12/11/2016</a:t>
+              <a:pPr/>
+              <a:t>12/12/2016</a:t>
             </a:fld>
             <a:endParaRPr lang="en-US"/>
           </a:p>
@@ -2300,6 +2672,7 @@
           <a:p>
             <a:fld id="{F9AA22BD-C43E-434F-87E0-4742B4EDAD8C}" type="slidenum">
               <a:rPr lang="en-US" smtClean="0"/>
+              <a:pPr/>
               <a:t>‹#›</a:t>
             </a:fld>
             <a:endParaRPr lang="en-US"/>
@@ -2309,7 +2682,7 @@
     </p:spTree>
     <p:extLst>
       <p:ext uri="{BB962C8B-B14F-4D97-AF65-F5344CB8AC3E}">
-        <p14:creationId xmlns:p14="http://schemas.microsoft.com/office/powerpoint/2010/main" val="2489790497"/>
+        <p14:creationId xmlns:p14="http://schemas.microsoft.com/office/powerpoint/2010/main" xmlns="" val="2489790497"/>
       </p:ext>
     </p:extLst>
   </p:cSld>
@@ -2511,7 +2884,8 @@
           <a:p>
             <a:fld id="{3877EA91-E04C-4D1C-A39E-FBD0799BEDD7}" type="datetimeFigureOut">
               <a:rPr lang="en-US" smtClean="0"/>
-              <a:t>12/11/2016</a:t>
+              <a:pPr/>
+              <a:t>12/12/2016</a:t>
             </a:fld>
             <a:endParaRPr lang="en-US"/>
           </a:p>
@@ -2553,6 +2927,7 @@
           <a:p>
             <a:fld id="{F9AA22BD-C43E-434F-87E0-4742B4EDAD8C}" type="slidenum">
               <a:rPr lang="en-US" smtClean="0"/>
+              <a:pPr/>
               <a:t>‹#›</a:t>
             </a:fld>
             <a:endParaRPr lang="en-US"/>
@@ -2562,7 +2937,7 @@
     </p:spTree>
     <p:extLst>
       <p:ext uri="{BB962C8B-B14F-4D97-AF65-F5344CB8AC3E}">
-        <p14:creationId xmlns:p14="http://schemas.microsoft.com/office/powerpoint/2010/main" val="3952036634"/>
+        <p14:creationId xmlns:p14="http://schemas.microsoft.com/office/powerpoint/2010/main" xmlns="" val="3952036634"/>
       </p:ext>
     </p:extLst>
   </p:cSld>
@@ -2578,20 +2953,8 @@
     <p:bg>
       <p:bgPr>
         <a:blipFill dpi="0" rotWithShape="1">
-          <a:blip r:embed="rId13">
-            <a:alphaModFix amt="42000"/>
+          <a:blip r:embed="rId13" cstate="print">
             <a:lum/>
-            <a:extLst>
-              <a:ext uri="{BEBA8EAE-BF5A-486C-A8C5-ECC9F3942E4B}">
-                <a14:imgProps xmlns:a14="http://schemas.microsoft.com/office/drawing/2010/main">
-                  <a14:imgLayer r:embed="rId14">
-                    <a14:imgEffect>
-                      <a14:saturation sat="50000"/>
-                    </a14:imgEffect>
-                  </a14:imgLayer>
-                </a14:imgProps>
-              </a:ext>
-            </a:extLst>
           </a:blip>
           <a:srcRect/>
           <a:stretch>
@@ -2745,7 +3108,8 @@
           <a:p>
             <a:fld id="{3877EA91-E04C-4D1C-A39E-FBD0799BEDD7}" type="datetimeFigureOut">
               <a:rPr lang="en-US" smtClean="0"/>
-              <a:t>12/11/2016</a:t>
+              <a:pPr/>
+              <a:t>12/12/2016</a:t>
             </a:fld>
             <a:endParaRPr lang="en-US"/>
           </a:p>
@@ -2823,6 +3187,7 @@
           <a:p>
             <a:fld id="{F9AA22BD-C43E-434F-87E0-4742B4EDAD8C}" type="slidenum">
               <a:rPr lang="en-US" smtClean="0"/>
+              <a:pPr/>
               <a:t>‹#›</a:t>
             </a:fld>
             <a:endParaRPr lang="en-US"/>
@@ -2832,7 +3197,7 @@
     </p:spTree>
     <p:extLst>
       <p:ext uri="{BB962C8B-B14F-4D97-AF65-F5344CB8AC3E}">
-        <p14:creationId xmlns:p14="http://schemas.microsoft.com/office/powerpoint/2010/main" val="2962468041"/>
+        <p14:creationId xmlns:p14="http://schemas.microsoft.com/office/powerpoint/2010/main" xmlns="" val="2962468041"/>
       </p:ext>
     </p:extLst>
   </p:cSld>
@@ -3106,6 +3471,21 @@
 <file path=ppt/slides/slide1.xml><?xml version="1.0" encoding="utf-8"?>
 <p:sld xmlns:a="http://schemas.openxmlformats.org/drawingml/2006/main" xmlns:r="http://schemas.openxmlformats.org/officeDocument/2006/relationships" xmlns:p="http://schemas.openxmlformats.org/presentationml/2006/main" showMasterSp="0">
   <p:cSld>
+    <p:bg>
+      <p:bgPr>
+        <a:blipFill dpi="0" rotWithShape="1">
+          <a:blip r:embed="rId2" cstate="print">
+            <a:alphaModFix amt="42000"/>
+            <a:lum/>
+          </a:blip>
+          <a:srcRect/>
+          <a:stretch>
+            <a:fillRect/>
+          </a:stretch>
+        </a:blipFill>
+        <a:effectLst/>
+      </p:bgPr>
+    </p:bg>
     <p:spTree>
       <p:nvGrpSpPr>
         <p:cNvPr id="1" name=""/>
@@ -3141,15 +3521,33 @@
           <a:lstStyle/>
           <a:p>
             <a:r>
-              <a:rPr lang="en-US" dirty="0"/>
-              <a:t>Solar P</a:t>
-            </a:r>
-            <a:r>
-              <a:rPr lang="en-US" dirty="0" smtClean="0"/>
-              <a:t>hotovoltaic </a:t>
-            </a:r>
-            <a:r>
-              <a:rPr lang="en-US" dirty="0"/>
+              <a:rPr lang="en-US" b="1" dirty="0">
+                <a:solidFill>
+                  <a:schemeClr val="accent6">
+                    <a:lumMod val="75000"/>
+                  </a:schemeClr>
+                </a:solidFill>
+              </a:rPr>
+              <a:t>Solar </a:t>
+            </a:r>
+            <a:r>
+              <a:rPr lang="en-US" b="1" dirty="0" smtClean="0">
+                <a:solidFill>
+                  <a:schemeClr val="accent6">
+                    <a:lumMod val="75000"/>
+                  </a:schemeClr>
+                </a:solidFill>
+              </a:rPr>
+              <a:t>PV </a:t>
+            </a:r>
+            <a:r>
+              <a:rPr lang="en-US" b="1" dirty="0">
+                <a:solidFill>
+                  <a:schemeClr val="accent6">
+                    <a:lumMod val="75000"/>
+                  </a:schemeClr>
+                </a:solidFill>
+              </a:rPr>
               <a:t>System Simulation</a:t>
             </a:r>
           </a:p>
@@ -3168,11 +3566,13 @@
         <p:spPr>
           <a:xfrm>
             <a:off x="381000" y="3886200"/>
-            <a:ext cx="8153400" cy="2514600"/>
+            <a:ext cx="8153400" cy="2667000"/>
           </a:xfrm>
         </p:spPr>
         <p:txBody>
-          <a:bodyPr/>
+          <a:bodyPr>
+            <a:normAutofit/>
+          </a:bodyPr>
           <a:lstStyle/>
           <a:p>
             <a:r>
@@ -3190,14 +3590,6 @@
                 </a:solidFill>
               </a:rPr>
               <a:t>Suman, </a:t>
-            </a:r>
-            <a:r>
-              <a:rPr lang="en-US" dirty="0" smtClean="0">
-                <a:solidFill>
-                  <a:schemeClr val="tx1"/>
-                </a:solidFill>
-              </a:rPr>
-              <a:t>and </a:t>
             </a:r>
             <a:r>
               <a:rPr lang="en-US" dirty="0" err="1" smtClean="0">
@@ -3222,13 +3614,20 @@
                 </a:solidFill>
               </a:rPr>
             </a:br>
-            <a:r>
-              <a:rPr lang="en-US" dirty="0" smtClean="0">
+            <a:endParaRPr lang="en-US" dirty="0" smtClean="0">
+              <a:solidFill>
+                <a:schemeClr val="tx1"/>
+              </a:solidFill>
+            </a:endParaRPr>
+          </a:p>
+          <a:p>
+            <a:r>
+              <a:rPr lang="en-US" sz="1800" dirty="0" smtClean="0">
                 <a:solidFill>
                   <a:schemeClr val="tx1"/>
                 </a:solidFill>
               </a:rPr>
-              <a:t>12/11/2016</a:t>
+              <a:t>Fall 2016</a:t>
             </a:r>
           </a:p>
           <a:p>
@@ -3240,14 +3639,46 @@
           </a:p>
           <a:p>
             <a:r>
-              <a:rPr lang="en-US" dirty="0" smtClean="0">
+              <a:rPr lang="en-US" sz="2400" dirty="0" smtClean="0">
                 <a:solidFill>
                   <a:schemeClr val="tx1"/>
                 </a:solidFill>
               </a:rPr>
-              <a:t>IS 604- Simulation and Modelling Technique</a:t>
-            </a:r>
-            <a:endParaRPr lang="en-US" dirty="0">
+              <a:t>DATA</a:t>
+            </a:r>
+            <a:r>
+              <a:rPr lang="en-US" sz="2400" dirty="0" smtClean="0">
+                <a:solidFill>
+                  <a:schemeClr val="tx1"/>
+                </a:solidFill>
+              </a:rPr>
+              <a:t> 604 - </a:t>
+            </a:r>
+            <a:r>
+              <a:rPr lang="en-US" sz="2400" dirty="0" smtClean="0">
+                <a:solidFill>
+                  <a:schemeClr val="tx1"/>
+                </a:solidFill>
+              </a:rPr>
+              <a:t>Simulation and </a:t>
+            </a:r>
+            <a:r>
+              <a:rPr lang="en-US" sz="2400" dirty="0" smtClean="0">
+                <a:solidFill>
+                  <a:schemeClr val="tx1"/>
+                </a:solidFill>
+              </a:rPr>
+              <a:t>Modeling </a:t>
+            </a:r>
+            <a:r>
+              <a:rPr lang="en-US" sz="2400" dirty="0" smtClean="0">
+                <a:solidFill>
+                  <a:schemeClr val="tx1"/>
+                </a:solidFill>
+              </a:rPr>
+              <a:t>Technique</a:t>
+            </a:r>
+            <a:endParaRPr lang="en-US" sz="2400" dirty="0">
               <a:solidFill>
                 <a:schemeClr val="tx1"/>
               </a:solidFill>
@@ -3258,7 +3689,7 @@
     </p:spTree>
     <p:extLst>
       <p:ext uri="{BB962C8B-B14F-4D97-AF65-F5344CB8AC3E}">
-        <p14:creationId xmlns:p14="http://schemas.microsoft.com/office/powerpoint/2010/main" val="987628861"/>
+        <p14:creationId xmlns:p14="http://schemas.microsoft.com/office/powerpoint/2010/main" xmlns="" val="987628861"/>
       </p:ext>
     </p:extLst>
   </p:cSld>
@@ -3276,7 +3707,7 @@
 </file>
 
 <file path=ppt/slides/slide2.xml><?xml version="1.0" encoding="utf-8"?>
-<p:sld xmlns:a="http://schemas.openxmlformats.org/drawingml/2006/main" xmlns:r="http://schemas.openxmlformats.org/officeDocument/2006/relationships" xmlns:p="http://schemas.openxmlformats.org/presentationml/2006/main" showMasterSp="0">
+<p:sld xmlns:a="http://schemas.openxmlformats.org/drawingml/2006/main" xmlns:r="http://schemas.openxmlformats.org/officeDocument/2006/relationships" xmlns:p="http://schemas.openxmlformats.org/presentationml/2006/main">
   <p:cSld>
     <p:spTree>
       <p:nvGrpSpPr>
@@ -3304,16 +3735,14 @@
         </p:nvSpPr>
         <p:spPr/>
         <p:txBody>
-          <a:bodyPr>
-            <a:normAutofit/>
-          </a:bodyPr>
-          <a:lstStyle/>
-          <a:p>
-            <a:r>
-              <a:rPr lang="en-US" sz="4000" dirty="0" smtClean="0"/>
-              <a:t>What is the purpose of this project?</a:t>
-            </a:r>
-            <a:endParaRPr lang="en-US" sz="4000" dirty="0"/>
+          <a:bodyPr/>
+          <a:lstStyle/>
+          <a:p>
+            <a:r>
+              <a:rPr lang="en-US" dirty="0" smtClean="0"/>
+              <a:t>Introduction</a:t>
+            </a:r>
+            <a:endParaRPr lang="en-US" dirty="0"/>
           </a:p>
         </p:txBody>
       </p:sp>
@@ -3329,15 +3758,47 @@
         </p:nvSpPr>
         <p:spPr/>
         <p:txBody>
-          <a:bodyPr>
-            <a:normAutofit fontScale="92500" lnSpcReduction="20000"/>
-          </a:bodyPr>
-          <a:lstStyle/>
-          <a:p>
-            <a:r>
-              <a:rPr lang="en-US" dirty="0"/>
-              <a:t>As awareness of climate change increases, there is a growing trend to reduce reliance on fossil fuel. The two popular methods of slowing down (and possibly reversing) climate change are reliance on renewable energy and carbon footprint reduction. Renewable energy comes in many forms but we will focus our attention solar power in this project. We will simulate various aspects of power generation with Solar Photovoltaic system and consider system size, power usage, and cost of obtaining a solar PV system. </a:t>
-            </a:r>
+          <a:bodyPr/>
+          <a:lstStyle/>
+          <a:p>
+            <a:r>
+              <a:rPr lang="en-US" dirty="0" err="1" smtClean="0"/>
+              <a:t>Sreejaya</a:t>
+            </a:r>
+            <a:r>
+              <a:rPr lang="en-US" dirty="0" smtClean="0"/>
+              <a:t> Nair</a:t>
+            </a:r>
+          </a:p>
+          <a:p>
+            <a:r>
+              <a:rPr lang="en-US" dirty="0" err="1" smtClean="0"/>
+              <a:t>Suman</a:t>
+            </a:r>
+            <a:r>
+              <a:rPr lang="en-US" dirty="0" smtClean="0"/>
+              <a:t> K </a:t>
+            </a:r>
+            <a:r>
+              <a:rPr lang="en-US" dirty="0" err="1" smtClean="0"/>
+              <a:t>Polavarapu</a:t>
+            </a:r>
+            <a:endParaRPr lang="en-US" dirty="0" smtClean="0"/>
+          </a:p>
+          <a:p>
+            <a:r>
+              <a:rPr lang="en-US" dirty="0" err="1" smtClean="0"/>
+              <a:t>Vuthy</a:t>
+            </a:r>
+            <a:r>
+              <a:rPr lang="en-US" dirty="0" smtClean="0"/>
+              <a:t> </a:t>
+            </a:r>
+            <a:r>
+              <a:rPr lang="en-US" dirty="0" err="1" smtClean="0"/>
+              <a:t>Nguy</a:t>
+            </a:r>
+            <a:endParaRPr lang="en-US" dirty="0" smtClean="0"/>
           </a:p>
           <a:p>
             <a:endParaRPr lang="en-US" dirty="0"/>
@@ -3345,11 +3806,6 @@
         </p:txBody>
       </p:sp>
     </p:spTree>
-    <p:extLst>
-      <p:ext uri="{BB962C8B-B14F-4D97-AF65-F5344CB8AC3E}">
-        <p14:creationId xmlns:p14="http://schemas.microsoft.com/office/powerpoint/2010/main" val="2697313826"/>
-      </p:ext>
-    </p:extLst>
   </p:cSld>
   <p:clrMapOvr>
     <a:masterClrMapping/>
@@ -3365,7 +3821,7 @@
 </file>
 
 <file path=ppt/slides/slide3.xml><?xml version="1.0" encoding="utf-8"?>
-<p:sld xmlns:a="http://schemas.openxmlformats.org/drawingml/2006/main" xmlns:r="http://schemas.openxmlformats.org/officeDocument/2006/relationships" xmlns:p="http://schemas.openxmlformats.org/presentationml/2006/main" showMasterSp="0">
+<p:sld xmlns:a="http://schemas.openxmlformats.org/drawingml/2006/main" xmlns:r="http://schemas.openxmlformats.org/officeDocument/2006/relationships" xmlns:p="http://schemas.openxmlformats.org/presentationml/2006/main">
   <p:cSld>
     <p:spTree>
       <p:nvGrpSpPr>
@@ -3391,87 +3847,76 @@
             <p:ph type="title"/>
           </p:nvPr>
         </p:nvSpPr>
-        <p:spPr>
-          <a:xfrm>
-            <a:off x="533400" y="304800"/>
-            <a:ext cx="8229600" cy="1295400"/>
-          </a:xfrm>
-        </p:spPr>
+        <p:spPr/>
+        <p:txBody>
+          <a:bodyPr/>
+          <a:lstStyle/>
+          <a:p>
+            <a:r>
+              <a:rPr lang="en-US" dirty="0" smtClean="0"/>
+              <a:t>Problem Description</a:t>
+            </a:r>
+            <a:endParaRPr lang="en-US" dirty="0"/>
+          </a:p>
+        </p:txBody>
+      </p:sp>
+      <p:sp>
+        <p:nvSpPr>
+          <p:cNvPr id="3" name="Content Placeholder 2"/>
+          <p:cNvSpPr>
+            <a:spLocks noGrp="1"/>
+          </p:cNvSpPr>
+          <p:nvPr>
+            <p:ph idx="1"/>
+          </p:nvPr>
+        </p:nvSpPr>
+        <p:spPr/>
         <p:txBody>
           <a:bodyPr>
-            <a:normAutofit fontScale="90000"/>
+            <a:normAutofit/>
           </a:bodyPr>
           <a:lstStyle/>
           <a:p>
-            <a:r>
-              <a:rPr lang="en-US" dirty="0" smtClean="0"/>
-              <a:t>This simulation is broken into two basic parts:</a:t>
-            </a:r>
-            <a:br>
-              <a:rPr lang="en-US" dirty="0" smtClean="0"/>
-            </a:br>
+            <a:pPr>
+              <a:buNone/>
+            </a:pPr>
+            <a:endParaRPr lang="en-US" sz="2400" dirty="0" smtClean="0"/>
+          </a:p>
+          <a:p>
+            <a:pPr>
+              <a:buNone/>
+            </a:pPr>
+            <a:r>
+              <a:rPr lang="en-US" sz="2400" dirty="0" smtClean="0"/>
+              <a:t>As </a:t>
+            </a:r>
+            <a:r>
+              <a:rPr lang="en-US" sz="2400" dirty="0" smtClean="0"/>
+              <a:t>awareness of climate change increases, there is a growing trend to reduce reliance on fossil fuel. </a:t>
+            </a:r>
+            <a:r>
+              <a:rPr lang="en-US" sz="2400" dirty="0" smtClean="0"/>
+              <a:t>Renewable </a:t>
+            </a:r>
+            <a:r>
+              <a:rPr lang="en-US" sz="2400" dirty="0" smtClean="0"/>
+              <a:t>energy comes in many forms but we will focus our </a:t>
+            </a:r>
+            <a:r>
+              <a:rPr lang="en-US" sz="2400" dirty="0" smtClean="0"/>
+              <a:t>attention on </a:t>
+            </a:r>
+            <a:r>
+              <a:rPr lang="en-US" sz="2400" dirty="0" smtClean="0"/>
+              <a:t>solar power in this project. We will simulate various aspects of power generation with Solar Photovoltaic system and consider system size, power usage, and cost of obtaining a solar PV system. </a:t>
+            </a:r>
+          </a:p>
+          <a:p>
             <a:endParaRPr lang="en-US" dirty="0"/>
           </a:p>
         </p:txBody>
       </p:sp>
-      <p:sp>
-        <p:nvSpPr>
-          <p:cNvPr id="3" name="Content Placeholder 2"/>
-          <p:cNvSpPr>
-            <a:spLocks noGrp="1"/>
-          </p:cNvSpPr>
-          <p:nvPr>
-            <p:ph idx="1"/>
-          </p:nvPr>
-        </p:nvSpPr>
-        <p:spPr/>
-        <p:txBody>
-          <a:bodyPr>
-            <a:normAutofit fontScale="92500" lnSpcReduction="20000"/>
-          </a:bodyPr>
-          <a:lstStyle/>
-          <a:p>
-            <a:pPr lvl="0"/>
-            <a:r>
-              <a:rPr lang="en-US" dirty="0" smtClean="0"/>
-              <a:t>Solar power generation</a:t>
-            </a:r>
-          </a:p>
-          <a:p>
-            <a:pPr marL="0" indent="0">
-              <a:buNone/>
-            </a:pPr>
-            <a:r>
-              <a:rPr lang="en-US" dirty="0" smtClean="0"/>
-              <a:t>	This section deals with various aspects of generating solar electricity. We simulate based on the amount of sunlight available each day of the year. </a:t>
-            </a:r>
-          </a:p>
-          <a:p>
-            <a:r>
-              <a:rPr lang="en-US" dirty="0" smtClean="0"/>
-              <a:t>Energy consumption</a:t>
-            </a:r>
-          </a:p>
-          <a:p>
-            <a:pPr marL="0" indent="0">
-              <a:buNone/>
-            </a:pPr>
-            <a:r>
-              <a:rPr lang="en-US" dirty="0" smtClean="0"/>
-              <a:t>This section deals with various aspects of consuming electricity. We simulate various usage patterns and conditions. These will include household size, energy usage based on time of day, etc.</a:t>
-            </a:r>
-          </a:p>
-          <a:p>
-            <a:endParaRPr lang="en-US" dirty="0"/>
-          </a:p>
-        </p:txBody>
-      </p:sp>
     </p:spTree>
-    <p:extLst>
-      <p:ext uri="{BB962C8B-B14F-4D97-AF65-F5344CB8AC3E}">
-        <p14:creationId xmlns:p14="http://schemas.microsoft.com/office/powerpoint/2010/main" val="2078949270"/>
-      </p:ext>
-    </p:extLst>
   </p:cSld>
   <p:clrMapOvr>
     <a:masterClrMapping/>
@@ -3487,7 +3932,7 @@
 </file>
 
 <file path=ppt/slides/slide4.xml><?xml version="1.0" encoding="utf-8"?>
-<p:sld xmlns:a="http://schemas.openxmlformats.org/drawingml/2006/main" xmlns:r="http://schemas.openxmlformats.org/officeDocument/2006/relationships" xmlns:p="http://schemas.openxmlformats.org/presentationml/2006/main" showMasterSp="0">
+<p:sld xmlns:a="http://schemas.openxmlformats.org/drawingml/2006/main" xmlns:r="http://schemas.openxmlformats.org/officeDocument/2006/relationships" xmlns:p="http://schemas.openxmlformats.org/presentationml/2006/main">
   <p:cSld>
     <p:spTree>
       <p:nvGrpSpPr>
@@ -3515,22 +3960,13 @@
         </p:nvSpPr>
         <p:spPr/>
         <p:txBody>
-          <a:bodyPr>
-            <a:normAutofit fontScale="90000"/>
-          </a:bodyPr>
-          <a:lstStyle/>
-          <a:p>
-            <a:r>
-              <a:rPr lang="en-US" b="1" dirty="0" smtClean="0">
-                <a:latin typeface="+mj-lt"/>
-              </a:rPr>
-              <a:t>Solar Power Generation- </a:t>
-            </a:r>
-            <a:br>
-              <a:rPr lang="en-US" b="1" dirty="0" smtClean="0">
-                <a:latin typeface="+mj-lt"/>
-              </a:rPr>
-            </a:br>
+          <a:bodyPr/>
+          <a:lstStyle/>
+          <a:p>
+            <a:r>
+              <a:rPr lang="en-US" dirty="0" smtClean="0"/>
+              <a:t>Challenges</a:t>
+            </a:r>
             <a:endParaRPr lang="en-US" dirty="0"/>
           </a:p>
         </p:txBody>
@@ -3545,66 +3981,63 @@
             <p:ph idx="1"/>
           </p:nvPr>
         </p:nvSpPr>
-        <p:spPr>
-          <a:xfrm>
-            <a:off x="457200" y="1371600"/>
-            <a:ext cx="8229600" cy="4953000"/>
-          </a:xfrm>
-        </p:spPr>
+        <p:spPr/>
         <p:txBody>
           <a:bodyPr>
             <a:normAutofit/>
           </a:bodyPr>
           <a:lstStyle/>
           <a:p>
-            <a:pPr marL="0" indent="0">
+            <a:pPr>
               <a:buNone/>
             </a:pPr>
-            <a:r>
-              <a:rPr lang="en-US" sz="3600" b="1" dirty="0" smtClean="0"/>
-              <a:t>Assumptions:</a:t>
-            </a:r>
-          </a:p>
-          <a:p>
-            <a:pPr lvl="0"/>
+            <a:endParaRPr lang="en-US" sz="2400" dirty="0" smtClean="0"/>
+          </a:p>
+          <a:p>
             <a:r>
               <a:rPr lang="en-US" dirty="0" smtClean="0"/>
-              <a:t>We </a:t>
-            </a:r>
-            <a:r>
-              <a:rPr lang="en-US" sz="3600" dirty="0" smtClean="0"/>
-              <a:t>assume</a:t>
-            </a:r>
+              <a:t>Variations to the data based on location</a:t>
+            </a:r>
+          </a:p>
+          <a:p>
+            <a:pPr lvl="1"/>
             <a:r>
               <a:rPr lang="en-US" dirty="0" smtClean="0"/>
-              <a:t> that solar intensity is constant throughout the day as well as the sun angle.</a:t>
-            </a:r>
-          </a:p>
-          <a:p>
-            <a:pPr lvl="0"/>
+              <a:t>Sunlight Amount</a:t>
+            </a:r>
+          </a:p>
+          <a:p>
+            <a:pPr lvl="1"/>
             <a:r>
               <a:rPr lang="en-US" dirty="0" smtClean="0"/>
-              <a:t>The equipment and installation cost is fixed. There is only a one-time fee associated with purchase and installation of the solar PV system. It is assumed that there is no repair cost for the life of the system.</a:t>
-            </a:r>
-          </a:p>
-          <a:p>
-            <a:pPr lvl="0"/>
+              <a:t>Electricity Usage Pattern</a:t>
+            </a:r>
+          </a:p>
+          <a:p>
+            <a:pPr lvl="2"/>
             <a:r>
               <a:rPr lang="en-US" dirty="0" smtClean="0"/>
-              <a:t>Grid Energy cost is fixed. </a:t>
-            </a:r>
-          </a:p>
-          <a:p>
+              <a:t>Warmer climate – Air Conditioner</a:t>
+            </a:r>
+          </a:p>
+          <a:p>
+            <a:pPr lvl="2"/>
+            <a:r>
+              <a:rPr lang="en-US" dirty="0" smtClean="0"/>
+              <a:t>Cooler climate – Space Heating</a:t>
+            </a:r>
+          </a:p>
+          <a:p>
+            <a:pPr lvl="1"/>
+            <a:r>
+              <a:rPr lang="en-US" dirty="0" smtClean="0"/>
+              <a:t>Electricity Cost</a:t>
+            </a:r>
             <a:endParaRPr lang="en-US" dirty="0"/>
           </a:p>
         </p:txBody>
       </p:sp>
     </p:spTree>
-    <p:extLst>
-      <p:ext uri="{BB962C8B-B14F-4D97-AF65-F5344CB8AC3E}">
-        <p14:creationId xmlns:p14="http://schemas.microsoft.com/office/powerpoint/2010/main" val="3462409327"/>
-      </p:ext>
-    </p:extLst>
   </p:cSld>
   <p:clrMapOvr>
     <a:masterClrMapping/>
@@ -3620,7 +4053,7 @@
 </file>
 
 <file path=ppt/slides/slide5.xml><?xml version="1.0" encoding="utf-8"?>
-<p:sld xmlns:a="http://schemas.openxmlformats.org/drawingml/2006/main" xmlns:r="http://schemas.openxmlformats.org/officeDocument/2006/relationships" xmlns:p="http://schemas.openxmlformats.org/presentationml/2006/main" showMasterSp="0">
+<p:sld xmlns:a="http://schemas.openxmlformats.org/drawingml/2006/main" xmlns:r="http://schemas.openxmlformats.org/officeDocument/2006/relationships" xmlns:p="http://schemas.openxmlformats.org/presentationml/2006/main">
   <p:cSld>
     <p:spTree>
       <p:nvGrpSpPr>
@@ -3648,74 +4081,46 @@
         </p:nvSpPr>
         <p:spPr/>
         <p:txBody>
+          <a:bodyPr>
+            <a:normAutofit/>
+          </a:bodyPr>
+          <a:lstStyle/>
+          <a:p>
+            <a:r>
+              <a:rPr lang="en-US" sz="2800" b="1" dirty="0" smtClean="0"/>
+              <a:t>Objective: </a:t>
+            </a:r>
+            <a:r>
+              <a:rPr lang="en-US" sz="2800" dirty="0" smtClean="0"/>
+              <a:t>Is it worth if to invest in a solar PV system</a:t>
+            </a:r>
+            <a:endParaRPr lang="en-US" sz="2800" dirty="0"/>
+          </a:p>
+        </p:txBody>
+      </p:sp>
+      <p:sp>
+        <p:nvSpPr>
+          <p:cNvPr id="3" name="Content Placeholder 2"/>
+          <p:cNvSpPr>
+            <a:spLocks noGrp="1"/>
+          </p:cNvSpPr>
+          <p:nvPr>
+            <p:ph idx="1"/>
+          </p:nvPr>
+        </p:nvSpPr>
+        <p:spPr/>
+        <p:txBody>
           <a:bodyPr/>
           <a:lstStyle/>
           <a:p>
             <a:r>
               <a:rPr lang="en-US" dirty="0" smtClean="0"/>
-              <a:t>Energy Consumption- </a:t>
-            </a:r>
-            <a:endParaRPr lang="en-US" dirty="0"/>
-          </a:p>
-        </p:txBody>
-      </p:sp>
-      <p:sp>
-        <p:nvSpPr>
-          <p:cNvPr id="3" name="Content Placeholder 2"/>
-          <p:cNvSpPr>
-            <a:spLocks noGrp="1"/>
-          </p:cNvSpPr>
-          <p:nvPr>
-            <p:ph idx="1"/>
-          </p:nvPr>
-        </p:nvSpPr>
-        <p:spPr/>
-        <p:txBody>
-          <a:bodyPr>
-            <a:normAutofit fontScale="92500" lnSpcReduction="10000"/>
-          </a:bodyPr>
-          <a:lstStyle/>
-          <a:p>
-            <a:r>
-              <a:rPr lang="en-US" dirty="0" smtClean="0"/>
-              <a:t>Assumptions:</a:t>
-            </a:r>
-          </a:p>
-          <a:p>
-            <a:pPr lvl="0"/>
-            <a:r>
-              <a:rPr lang="en-US" dirty="0" smtClean="0"/>
-              <a:t>Energy consumptions from electronics are constant. The device is either on or off.  The devices will not consume different amounts of energy based on usage.</a:t>
-            </a:r>
-          </a:p>
-          <a:p>
-            <a:pPr lvl="0"/>
-            <a:r>
-              <a:rPr lang="en-US" dirty="0" smtClean="0"/>
-              <a:t>We do not calculate carbon cost, rather we simulate energy consumption and attribute a unit of electricity to a theoretical unit of Carbon Cost</a:t>
-            </a:r>
-          </a:p>
-          <a:p>
-            <a:pPr lvl="0"/>
-            <a:r>
-              <a:rPr lang="en-US" dirty="0" smtClean="0"/>
-              <a:t>We assume all appliances are electrical. We assume electric heaters, electric stove, etc.</a:t>
-            </a:r>
-          </a:p>
-          <a:p>
-            <a:pPr marL="0" indent="0">
-              <a:buNone/>
-            </a:pPr>
-            <a:endParaRPr lang="en-US" dirty="0"/>
+              <a:t>At what size will I completely offset my monthly/yearly bill?</a:t>
+            </a:r>
           </a:p>
         </p:txBody>
       </p:sp>
     </p:spTree>
-    <p:extLst>
-      <p:ext uri="{BB962C8B-B14F-4D97-AF65-F5344CB8AC3E}">
-        <p14:creationId xmlns:p14="http://schemas.microsoft.com/office/powerpoint/2010/main" val="828707056"/>
-      </p:ext>
-    </p:extLst>
   </p:cSld>
   <p:clrMapOvr>
     <a:masterClrMapping/>
@@ -3727,6 +4132,276 @@
       </p:par>
     </p:tnLst>
   </p:timing>
+</p:sld>
+</file>
+
+<file path=ppt/slides/slide6.xml><?xml version="1.0" encoding="utf-8"?>
+<p:sld xmlns:a="http://schemas.openxmlformats.org/drawingml/2006/main" xmlns:r="http://schemas.openxmlformats.org/officeDocument/2006/relationships" xmlns:p="http://schemas.openxmlformats.org/presentationml/2006/main">
+  <p:cSld>
+    <p:spTree>
+      <p:nvGrpSpPr>
+        <p:cNvPr id="1" name=""/>
+        <p:cNvGrpSpPr/>
+        <p:nvPr/>
+      </p:nvGrpSpPr>
+      <p:grpSpPr>
+        <a:xfrm>
+          <a:off x="0" y="0"/>
+          <a:ext cx="0" cy="0"/>
+          <a:chOff x="0" y="0"/>
+          <a:chExt cx="0" cy="0"/>
+        </a:xfrm>
+      </p:grpSpPr>
+      <p:sp>
+        <p:nvSpPr>
+          <p:cNvPr id="2" name="Title 1"/>
+          <p:cNvSpPr>
+            <a:spLocks noGrp="1"/>
+          </p:cNvSpPr>
+          <p:nvPr>
+            <p:ph type="title"/>
+          </p:nvPr>
+        </p:nvSpPr>
+        <p:spPr/>
+        <p:txBody>
+          <a:bodyPr/>
+          <a:lstStyle/>
+          <a:p>
+            <a:r>
+              <a:rPr lang="en-US" dirty="0" smtClean="0"/>
+              <a:t>Approach</a:t>
+            </a:r>
+            <a:endParaRPr lang="en-US" dirty="0"/>
+          </a:p>
+        </p:txBody>
+      </p:sp>
+      <p:sp>
+        <p:nvSpPr>
+          <p:cNvPr id="3" name="Content Placeholder 2"/>
+          <p:cNvSpPr>
+            <a:spLocks noGrp="1"/>
+          </p:cNvSpPr>
+          <p:nvPr>
+            <p:ph idx="1"/>
+          </p:nvPr>
+        </p:nvSpPr>
+        <p:spPr/>
+        <p:txBody>
+          <a:bodyPr/>
+          <a:lstStyle/>
+          <a:p>
+            <a:r>
+              <a:rPr lang="en-US" dirty="0" smtClean="0"/>
+              <a:t>Two basic parts</a:t>
+            </a:r>
+          </a:p>
+          <a:p>
+            <a:pPr lvl="1"/>
+            <a:r>
+              <a:rPr lang="en-US" dirty="0" smtClean="0"/>
+              <a:t>Solar power Generation</a:t>
+            </a:r>
+          </a:p>
+          <a:p>
+            <a:pPr lvl="1"/>
+            <a:r>
+              <a:rPr lang="en-US" dirty="0" smtClean="0"/>
+              <a:t>Electricity Consumption</a:t>
+            </a:r>
+            <a:endParaRPr lang="en-US" dirty="0"/>
+          </a:p>
+        </p:txBody>
+      </p:sp>
+    </p:spTree>
+  </p:cSld>
+  <p:clrMapOvr>
+    <a:masterClrMapping/>
+  </p:clrMapOvr>
+  <p:timing>
+    <p:tnLst>
+      <p:par>
+        <p:cTn id="1" dur="indefinite" restart="never" nodeType="tmRoot"/>
+      </p:par>
+    </p:tnLst>
+  </p:timing>
+</p:sld>
+</file>
+
+<file path=ppt/slides/slide7.xml><?xml version="1.0" encoding="utf-8"?>
+<p:sld xmlns:a="http://schemas.openxmlformats.org/drawingml/2006/main" xmlns:r="http://schemas.openxmlformats.org/officeDocument/2006/relationships" xmlns:p="http://schemas.openxmlformats.org/presentationml/2006/main">
+  <p:cSld>
+    <p:spTree>
+      <p:nvGrpSpPr>
+        <p:cNvPr id="1" name=""/>
+        <p:cNvGrpSpPr/>
+        <p:nvPr/>
+      </p:nvGrpSpPr>
+      <p:grpSpPr>
+        <a:xfrm>
+          <a:off x="0" y="0"/>
+          <a:ext cx="0" cy="0"/>
+          <a:chOff x="0" y="0"/>
+          <a:chExt cx="0" cy="0"/>
+        </a:xfrm>
+      </p:grpSpPr>
+      <p:sp>
+        <p:nvSpPr>
+          <p:cNvPr id="2" name="Title 1"/>
+          <p:cNvSpPr>
+            <a:spLocks noGrp="1"/>
+          </p:cNvSpPr>
+          <p:nvPr>
+            <p:ph type="title"/>
+          </p:nvPr>
+        </p:nvSpPr>
+        <p:spPr/>
+        <p:txBody>
+          <a:bodyPr/>
+          <a:lstStyle/>
+          <a:p>
+            <a:r>
+              <a:rPr lang="en-US" dirty="0" smtClean="0"/>
+              <a:t>Summary</a:t>
+            </a:r>
+            <a:endParaRPr lang="en-US" dirty="0"/>
+          </a:p>
+        </p:txBody>
+      </p:sp>
+      <p:sp>
+        <p:nvSpPr>
+          <p:cNvPr id="3" name="Content Placeholder 2"/>
+          <p:cNvSpPr>
+            <a:spLocks noGrp="1"/>
+          </p:cNvSpPr>
+          <p:nvPr>
+            <p:ph idx="1"/>
+          </p:nvPr>
+        </p:nvSpPr>
+        <p:spPr/>
+        <p:txBody>
+          <a:bodyPr/>
+          <a:lstStyle/>
+          <a:p>
+            <a:pPr>
+              <a:buNone/>
+            </a:pPr>
+            <a:r>
+              <a:rPr lang="en-US" dirty="0" smtClean="0"/>
+              <a:t>&lt;CHART&gt; - Panel size Vs yearly costs</a:t>
+            </a:r>
+          </a:p>
+          <a:p>
+            <a:pPr>
+              <a:buNone/>
+            </a:pPr>
+            <a:r>
+              <a:rPr lang="en-US" dirty="0" smtClean="0"/>
+              <a:t>For the typical (suburban) New York family, a PV system consisting of XXX number of panels will be needed to virtually offset monthly/yearly electricity costs.</a:t>
+            </a:r>
+            <a:endParaRPr lang="en-US" dirty="0"/>
+          </a:p>
+        </p:txBody>
+      </p:sp>
+    </p:spTree>
+  </p:cSld>
+  <p:clrMapOvr>
+    <a:masterClrMapping/>
+  </p:clrMapOvr>
+</p:sld>
+</file>
+
+<file path=ppt/slides/slide8.xml><?xml version="1.0" encoding="utf-8"?>
+<p:sld xmlns:a="http://schemas.openxmlformats.org/drawingml/2006/main" xmlns:r="http://schemas.openxmlformats.org/officeDocument/2006/relationships" xmlns:p="http://schemas.openxmlformats.org/presentationml/2006/main">
+  <p:cSld>
+    <p:spTree>
+      <p:nvGrpSpPr>
+        <p:cNvPr id="1" name=""/>
+        <p:cNvGrpSpPr/>
+        <p:nvPr/>
+      </p:nvGrpSpPr>
+      <p:grpSpPr>
+        <a:xfrm>
+          <a:off x="0" y="0"/>
+          <a:ext cx="0" cy="0"/>
+          <a:chOff x="0" y="0"/>
+          <a:chExt cx="0" cy="0"/>
+        </a:xfrm>
+      </p:grpSpPr>
+      <p:sp>
+        <p:nvSpPr>
+          <p:cNvPr id="2" name="Title 1"/>
+          <p:cNvSpPr>
+            <a:spLocks noGrp="1"/>
+          </p:cNvSpPr>
+          <p:nvPr>
+            <p:ph type="title"/>
+          </p:nvPr>
+        </p:nvSpPr>
+        <p:spPr/>
+        <p:txBody>
+          <a:bodyPr/>
+          <a:lstStyle/>
+          <a:p>
+            <a:r>
+              <a:rPr lang="en-US" dirty="0" smtClean="0"/>
+              <a:t>Future Work</a:t>
+            </a:r>
+            <a:endParaRPr lang="en-US" dirty="0"/>
+          </a:p>
+        </p:txBody>
+      </p:sp>
+      <p:sp>
+        <p:nvSpPr>
+          <p:cNvPr id="3" name="Content Placeholder 2"/>
+          <p:cNvSpPr>
+            <a:spLocks noGrp="1"/>
+          </p:cNvSpPr>
+          <p:nvPr>
+            <p:ph idx="1"/>
+          </p:nvPr>
+        </p:nvSpPr>
+        <p:spPr/>
+        <p:txBody>
+          <a:bodyPr/>
+          <a:lstStyle/>
+          <a:p>
+            <a:r>
+              <a:rPr lang="en-US" dirty="0" smtClean="0"/>
+              <a:t>More granular level for power consumption simulation</a:t>
+            </a:r>
+          </a:p>
+          <a:p>
+            <a:pPr lvl="1"/>
+            <a:r>
+              <a:rPr lang="en-US" dirty="0" smtClean="0"/>
+              <a:t>Breakdown of appliances</a:t>
+            </a:r>
+          </a:p>
+          <a:p>
+            <a:pPr lvl="1"/>
+            <a:r>
+              <a:rPr lang="en-US" dirty="0" smtClean="0"/>
+              <a:t>Family composition</a:t>
+            </a:r>
+          </a:p>
+          <a:p>
+            <a:pPr lvl="1"/>
+            <a:endParaRPr lang="en-US" dirty="0" smtClean="0"/>
+          </a:p>
+          <a:p>
+            <a:r>
+              <a:rPr lang="en-US" dirty="0" smtClean="0"/>
+              <a:t>Interactive application to change simulation parameters</a:t>
+            </a:r>
+            <a:endParaRPr lang="en-US" dirty="0" smtClean="0"/>
+          </a:p>
+        </p:txBody>
+      </p:sp>
+    </p:spTree>
+  </p:cSld>
+  <p:clrMapOvr>
+    <a:masterClrMapping/>
+  </p:clrMapOvr>
 </p:sld>
 </file>
 
@@ -4013,4 +4688,287 @@
   <a:objectDefaults/>
   <a:extraClrSchemeLst/>
 </a:theme>
+</file>
+
+<file path=ppt/theme/theme2.xml><?xml version="1.0" encoding="utf-8"?>
+<a:theme xmlns:a="http://schemas.openxmlformats.org/drawingml/2006/main" name="Office Theme">
+  <a:themeElements>
+    <a:clrScheme name="Office">
+      <a:dk1>
+        <a:sysClr val="windowText" lastClr="000000"/>
+      </a:dk1>
+      <a:lt1>
+        <a:sysClr val="window" lastClr="FFFFFF"/>
+      </a:lt1>
+      <a:dk2>
+        <a:srgbClr val="1F497D"/>
+      </a:dk2>
+      <a:lt2>
+        <a:srgbClr val="EEECE1"/>
+      </a:lt2>
+      <a:accent1>
+        <a:srgbClr val="4F81BD"/>
+      </a:accent1>
+      <a:accent2>
+        <a:srgbClr val="C0504D"/>
+      </a:accent2>
+      <a:accent3>
+        <a:srgbClr val="9BBB59"/>
+      </a:accent3>
+      <a:accent4>
+        <a:srgbClr val="8064A2"/>
+      </a:accent4>
+      <a:accent5>
+        <a:srgbClr val="4BACC6"/>
+      </a:accent5>
+      <a:accent6>
+        <a:srgbClr val="F79646"/>
+      </a:accent6>
+      <a:hlink>
+        <a:srgbClr val="0000FF"/>
+      </a:hlink>
+      <a:folHlink>
+        <a:srgbClr val="800080"/>
+      </a:folHlink>
+    </a:clrScheme>
+    <a:fontScheme name="Office">
+      <a:majorFont>
+        <a:latin typeface="Calibri"/>
+        <a:ea typeface=""/>
+        <a:cs typeface=""/>
+        <a:font script="Jpan" typeface="ＭＳ Ｐゴシック"/>
+        <a:font script="Hang" typeface="맑은 고딕"/>
+        <a:font script="Hans" typeface="宋体"/>
+        <a:font script="Hant" typeface="新細明體"/>
+        <a:font script="Arab" typeface="Times New Roman"/>
+        <a:font script="Hebr" typeface="Times New Roman"/>
+        <a:font script="Thai" typeface="Angsana New"/>
+        <a:font script="Ethi" typeface="Nyala"/>
+        <a:font script="Beng" typeface="Vrinda"/>
+        <a:font script="Gujr" typeface="Shruti"/>
+        <a:font script="Khmr" typeface="MoolBoran"/>
+        <a:font script="Knda" typeface="Tunga"/>
+        <a:font script="Guru" typeface="Raavi"/>
+        <a:font script="Cans" typeface="Euphemia"/>
+        <a:font script="Cher" typeface="Plantagenet Cherokee"/>
+        <a:font script="Yiii" typeface="Microsoft Yi Baiti"/>
+        <a:font script="Tibt" typeface="Microsoft Himalaya"/>
+        <a:font script="Thaa" typeface="MV Boli"/>
+        <a:font script="Deva" typeface="Mangal"/>
+        <a:font script="Telu" typeface="Gautami"/>
+        <a:font script="Taml" typeface="Latha"/>
+        <a:font script="Syrc" typeface="Estrangelo Edessa"/>
+        <a:font script="Orya" typeface="Kalinga"/>
+        <a:font script="Mlym" typeface="Kartika"/>
+        <a:font script="Laoo" typeface="DokChampa"/>
+        <a:font script="Sinh" typeface="Iskoola Pota"/>
+        <a:font script="Mong" typeface="Mongolian Baiti"/>
+        <a:font script="Viet" typeface="Times New Roman"/>
+        <a:font script="Uigh" typeface="Microsoft Uighur"/>
+      </a:majorFont>
+      <a:minorFont>
+        <a:latin typeface="Calibri"/>
+        <a:ea typeface=""/>
+        <a:cs typeface=""/>
+        <a:font script="Jpan" typeface="ＭＳ Ｐゴシック"/>
+        <a:font script="Hang" typeface="맑은 고딕"/>
+        <a:font script="Hans" typeface="宋体"/>
+        <a:font script="Hant" typeface="新細明體"/>
+        <a:font script="Arab" typeface="Arial"/>
+        <a:font script="Hebr" typeface="Arial"/>
+        <a:font script="Thai" typeface="Cordia New"/>
+        <a:font script="Ethi" typeface="Nyala"/>
+        <a:font script="Beng" typeface="Vrinda"/>
+        <a:font script="Gujr" typeface="Shruti"/>
+        <a:font script="Khmr" typeface="DaunPenh"/>
+        <a:font script="Knda" typeface="Tunga"/>
+        <a:font script="Guru" typeface="Raavi"/>
+        <a:font script="Cans" typeface="Euphemia"/>
+        <a:font script="Cher" typeface="Plantagenet Cherokee"/>
+        <a:font script="Yiii" typeface="Microsoft Yi Baiti"/>
+        <a:font script="Tibt" typeface="Microsoft Himalaya"/>
+        <a:font script="Thaa" typeface="MV Boli"/>
+        <a:font script="Deva" typeface="Mangal"/>
+        <a:font script="Telu" typeface="Gautami"/>
+        <a:font script="Taml" typeface="Latha"/>
+        <a:font script="Syrc" typeface="Estrangelo Edessa"/>
+        <a:font script="Orya" typeface="Kalinga"/>
+        <a:font script="Mlym" typeface="Kartika"/>
+        <a:font script="Laoo" typeface="DokChampa"/>
+        <a:font script="Sinh" typeface="Iskoola Pota"/>
+        <a:font script="Mong" typeface="Mongolian Baiti"/>
+        <a:font script="Viet" typeface="Arial"/>
+        <a:font script="Uigh" typeface="Microsoft Uighur"/>
+      </a:minorFont>
+    </a:fontScheme>
+    <a:fmtScheme name="Office">
+      <a:fillStyleLst>
+        <a:solidFill>
+          <a:schemeClr val="phClr"/>
+        </a:solidFill>
+        <a:gradFill rotWithShape="1">
+          <a:gsLst>
+            <a:gs pos="0">
+              <a:schemeClr val="phClr">
+                <a:tint val="50000"/>
+                <a:satMod val="300000"/>
+              </a:schemeClr>
+            </a:gs>
+            <a:gs pos="35000">
+              <a:schemeClr val="phClr">
+                <a:tint val="37000"/>
+                <a:satMod val="300000"/>
+              </a:schemeClr>
+            </a:gs>
+            <a:gs pos="100000">
+              <a:schemeClr val="phClr">
+                <a:tint val="15000"/>
+                <a:satMod val="350000"/>
+              </a:schemeClr>
+            </a:gs>
+          </a:gsLst>
+          <a:lin ang="16200000" scaled="1"/>
+        </a:gradFill>
+        <a:gradFill rotWithShape="1">
+          <a:gsLst>
+            <a:gs pos="0">
+              <a:schemeClr val="phClr">
+                <a:shade val="51000"/>
+                <a:satMod val="130000"/>
+              </a:schemeClr>
+            </a:gs>
+            <a:gs pos="80000">
+              <a:schemeClr val="phClr">
+                <a:shade val="93000"/>
+                <a:satMod val="130000"/>
+              </a:schemeClr>
+            </a:gs>
+            <a:gs pos="100000">
+              <a:schemeClr val="phClr">
+                <a:shade val="94000"/>
+                <a:satMod val="135000"/>
+              </a:schemeClr>
+            </a:gs>
+          </a:gsLst>
+          <a:lin ang="16200000" scaled="0"/>
+        </a:gradFill>
+      </a:fillStyleLst>
+      <a:lnStyleLst>
+        <a:ln w="9525" cap="flat" cmpd="sng" algn="ctr">
+          <a:solidFill>
+            <a:schemeClr val="phClr">
+              <a:shade val="95000"/>
+              <a:satMod val="105000"/>
+            </a:schemeClr>
+          </a:solidFill>
+          <a:prstDash val="solid"/>
+        </a:ln>
+        <a:ln w="25400" cap="flat" cmpd="sng" algn="ctr">
+          <a:solidFill>
+            <a:schemeClr val="phClr"/>
+          </a:solidFill>
+          <a:prstDash val="solid"/>
+        </a:ln>
+        <a:ln w="38100" cap="flat" cmpd="sng" algn="ctr">
+          <a:solidFill>
+            <a:schemeClr val="phClr"/>
+          </a:solidFill>
+          <a:prstDash val="solid"/>
+        </a:ln>
+      </a:lnStyleLst>
+      <a:effectStyleLst>
+        <a:effectStyle>
+          <a:effectLst>
+            <a:outerShdw blurRad="40000" dist="20000" dir="5400000" rotWithShape="0">
+              <a:srgbClr val="000000">
+                <a:alpha val="38000"/>
+              </a:srgbClr>
+            </a:outerShdw>
+          </a:effectLst>
+        </a:effectStyle>
+        <a:effectStyle>
+          <a:effectLst>
+            <a:outerShdw blurRad="40000" dist="23000" dir="5400000" rotWithShape="0">
+              <a:srgbClr val="000000">
+                <a:alpha val="35000"/>
+              </a:srgbClr>
+            </a:outerShdw>
+          </a:effectLst>
+        </a:effectStyle>
+        <a:effectStyle>
+          <a:effectLst>
+            <a:outerShdw blurRad="40000" dist="23000" dir="5400000" rotWithShape="0">
+              <a:srgbClr val="000000">
+                <a:alpha val="35000"/>
+              </a:srgbClr>
+            </a:outerShdw>
+          </a:effectLst>
+          <a:scene3d>
+            <a:camera prst="orthographicFront">
+              <a:rot lat="0" lon="0" rev="0"/>
+            </a:camera>
+            <a:lightRig rig="threePt" dir="t">
+              <a:rot lat="0" lon="0" rev="1200000"/>
+            </a:lightRig>
+          </a:scene3d>
+          <a:sp3d>
+            <a:bevelT w="63500" h="25400"/>
+          </a:sp3d>
+        </a:effectStyle>
+      </a:effectStyleLst>
+      <a:bgFillStyleLst>
+        <a:solidFill>
+          <a:schemeClr val="phClr"/>
+        </a:solidFill>
+        <a:gradFill rotWithShape="1">
+          <a:gsLst>
+            <a:gs pos="0">
+              <a:schemeClr val="phClr">
+                <a:tint val="40000"/>
+                <a:satMod val="350000"/>
+              </a:schemeClr>
+            </a:gs>
+            <a:gs pos="40000">
+              <a:schemeClr val="phClr">
+                <a:tint val="45000"/>
+                <a:shade val="99000"/>
+                <a:satMod val="350000"/>
+              </a:schemeClr>
+            </a:gs>
+            <a:gs pos="100000">
+              <a:schemeClr val="phClr">
+                <a:shade val="20000"/>
+                <a:satMod val="255000"/>
+              </a:schemeClr>
+            </a:gs>
+          </a:gsLst>
+          <a:path path="circle">
+            <a:fillToRect l="50000" t="-80000" r="50000" b="180000"/>
+          </a:path>
+        </a:gradFill>
+        <a:gradFill rotWithShape="1">
+          <a:gsLst>
+            <a:gs pos="0">
+              <a:schemeClr val="phClr">
+                <a:tint val="80000"/>
+                <a:satMod val="300000"/>
+              </a:schemeClr>
+            </a:gs>
+            <a:gs pos="100000">
+              <a:schemeClr val="phClr">
+                <a:shade val="30000"/>
+                <a:satMod val="200000"/>
+              </a:schemeClr>
+            </a:gs>
+          </a:gsLst>
+          <a:path path="circle">
+            <a:fillToRect l="50000" t="50000" r="50000" b="50000"/>
+          </a:path>
+        </a:gradFill>
+      </a:bgFillStyleLst>
+    </a:fmtScheme>
+  </a:themeElements>
+  <a:objectDefaults/>
+  <a:extraClrSchemeLst/>
+</a:theme>
 </file>
</xml_diff>